<commit_message>
Updated Relational Model.pptx and added relationship to ServiceEntity.java and added enum to OrderEntity.java
</commit_message>
<xml_diff>
--- a/Deliverables/Relational Model.pptx
+++ b/Deliverables/Relational Model.pptx
@@ -707,7 +707,7 @@
           <a:p>
             <a:fld id="{1A98E586-BE26-45CF-A16C-F0F962A0AAAF}" type="datetimeFigureOut">
               <a:rPr lang="en-US" smtClean="0"/>
-              <a:t>12/10/2021</a:t>
+              <a:t>3/3/2022</a:t>
             </a:fld>
             <a:endParaRPr lang="en-US"/>
           </a:p>
@@ -877,7 +877,7 @@
           <a:p>
             <a:fld id="{1A98E586-BE26-45CF-A16C-F0F962A0AAAF}" type="datetimeFigureOut">
               <a:rPr lang="en-US" smtClean="0"/>
-              <a:t>12/10/2021</a:t>
+              <a:t>3/3/2022</a:t>
             </a:fld>
             <a:endParaRPr lang="en-US"/>
           </a:p>
@@ -1057,7 +1057,7 @@
           <a:p>
             <a:fld id="{1A98E586-BE26-45CF-A16C-F0F962A0AAAF}" type="datetimeFigureOut">
               <a:rPr lang="en-US" smtClean="0"/>
-              <a:t>12/10/2021</a:t>
+              <a:t>3/3/2022</a:t>
             </a:fld>
             <a:endParaRPr lang="en-US"/>
           </a:p>
@@ -1227,7 +1227,7 @@
           <a:p>
             <a:fld id="{1A98E586-BE26-45CF-A16C-F0F962A0AAAF}" type="datetimeFigureOut">
               <a:rPr lang="en-US" smtClean="0"/>
-              <a:t>12/10/2021</a:t>
+              <a:t>3/3/2022</a:t>
             </a:fld>
             <a:endParaRPr lang="en-US"/>
           </a:p>
@@ -1473,7 +1473,7 @@
           <a:p>
             <a:fld id="{1A98E586-BE26-45CF-A16C-F0F962A0AAAF}" type="datetimeFigureOut">
               <a:rPr lang="en-US" smtClean="0"/>
-              <a:t>12/10/2021</a:t>
+              <a:t>3/3/2022</a:t>
             </a:fld>
             <a:endParaRPr lang="en-US"/>
           </a:p>
@@ -1705,7 +1705,7 @@
           <a:p>
             <a:fld id="{1A98E586-BE26-45CF-A16C-F0F962A0AAAF}" type="datetimeFigureOut">
               <a:rPr lang="en-US" smtClean="0"/>
-              <a:t>12/10/2021</a:t>
+              <a:t>3/3/2022</a:t>
             </a:fld>
             <a:endParaRPr lang="en-US"/>
           </a:p>
@@ -2072,7 +2072,7 @@
           <a:p>
             <a:fld id="{1A98E586-BE26-45CF-A16C-F0F962A0AAAF}" type="datetimeFigureOut">
               <a:rPr lang="en-US" smtClean="0"/>
-              <a:t>12/10/2021</a:t>
+              <a:t>3/3/2022</a:t>
             </a:fld>
             <a:endParaRPr lang="en-US"/>
           </a:p>
@@ -2190,7 +2190,7 @@
           <a:p>
             <a:fld id="{1A98E586-BE26-45CF-A16C-F0F962A0AAAF}" type="datetimeFigureOut">
               <a:rPr lang="en-US" smtClean="0"/>
-              <a:t>12/10/2021</a:t>
+              <a:t>3/3/2022</a:t>
             </a:fld>
             <a:endParaRPr lang="en-US"/>
           </a:p>
@@ -2285,7 +2285,7 @@
           <a:p>
             <a:fld id="{1A98E586-BE26-45CF-A16C-F0F962A0AAAF}" type="datetimeFigureOut">
               <a:rPr lang="en-US" smtClean="0"/>
-              <a:t>12/10/2021</a:t>
+              <a:t>3/3/2022</a:t>
             </a:fld>
             <a:endParaRPr lang="en-US"/>
           </a:p>
@@ -2562,7 +2562,7 @@
           <a:p>
             <a:fld id="{1A98E586-BE26-45CF-A16C-F0F962A0AAAF}" type="datetimeFigureOut">
               <a:rPr lang="en-US" smtClean="0"/>
-              <a:t>12/10/2021</a:t>
+              <a:t>3/3/2022</a:t>
             </a:fld>
             <a:endParaRPr lang="en-US"/>
           </a:p>
@@ -2819,7 +2819,7 @@
           <a:p>
             <a:fld id="{1A98E586-BE26-45CF-A16C-F0F962A0AAAF}" type="datetimeFigureOut">
               <a:rPr lang="en-US" smtClean="0"/>
-              <a:t>12/10/2021</a:t>
+              <a:t>3/3/2022</a:t>
             </a:fld>
             <a:endParaRPr lang="en-US"/>
           </a:p>
@@ -3032,7 +3032,7 @@
           <a:p>
             <a:fld id="{1A98E586-BE26-45CF-A16C-F0F962A0AAAF}" type="datetimeFigureOut">
               <a:rPr lang="en-US" smtClean="0"/>
-              <a:t>12/10/2021</a:t>
+              <a:t>3/3/2022</a:t>
             </a:fld>
             <a:endParaRPr lang="en-US"/>
           </a:p>
@@ -3623,12 +3623,20 @@
               <a:t>Alert(</a:t>
             </a:r>
             <a:r>
+              <a:rPr lang="en-US" sz="1600" b="1" dirty="0" err="1"/>
+              <a:t>AlertID</a:t>
+            </a:r>
+            <a:r>
+              <a:rPr lang="en-US" sz="1600" dirty="0" err="1"/>
+              <a:t>,</a:t>
+            </a:r>
+            <a:r>
+              <a:rPr lang="en-US" sz="1600" u="sng" dirty="0" err="1"/>
+              <a:t>Username</a:t>
+            </a:r>
+            <a:r>
               <a:rPr lang="en-US" sz="1600" b="1" u="sng" dirty="0"/>
-              <a:t>Username, </a:t>
-            </a:r>
-            <a:r>
-              <a:rPr lang="en-US" sz="1600" u="sng" dirty="0"/>
-              <a:t>Email,</a:t>
+              <a:t>,</a:t>
             </a:r>
             <a:r>
               <a:rPr lang="en-US" sz="1600" dirty="0"/>
@@ -4031,9 +4039,9 @@
           <p:nvPr/>
         </p:nvCxnSpPr>
         <p:spPr>
-          <a:xfrm flipV="1">
-            <a:off x="1287262" y="3160450"/>
-            <a:ext cx="8878" cy="591476"/>
+          <a:xfrm flipH="1" flipV="1">
+            <a:off x="1296140" y="3160450"/>
+            <a:ext cx="435006" cy="559294"/>
           </a:xfrm>
           <a:prstGeom prst="straightConnector1">
             <a:avLst/>
@@ -4164,47 +4172,6 @@
           </a:fillRef>
           <a:effectRef idx="2">
             <a:schemeClr val="accent6"/>
-          </a:effectRef>
-          <a:fontRef idx="minor">
-            <a:schemeClr val="tx1"/>
-          </a:fontRef>
-        </p:style>
-      </p:cxnSp>
-      <p:cxnSp>
-        <p:nvCxnSpPr>
-          <p:cNvPr id="29" name="Connettore 2 28">
-            <a:extLst>
-              <a:ext uri="{FF2B5EF4-FFF2-40B4-BE49-F238E27FC236}">
-                <a16:creationId xmlns:a16="http://schemas.microsoft.com/office/drawing/2014/main" id="{ADC3AD82-F431-4AF7-8678-B10639D855D9}"/>
-              </a:ext>
-            </a:extLst>
-          </p:cNvPr>
-          <p:cNvCxnSpPr>
-            <a:cxnSpLocks/>
-          </p:cNvCxnSpPr>
-          <p:nvPr/>
-        </p:nvCxnSpPr>
-        <p:spPr>
-          <a:xfrm flipH="1" flipV="1">
-            <a:off x="2068497" y="3160450"/>
-            <a:ext cx="1" cy="591476"/>
-          </a:xfrm>
-          <a:prstGeom prst="straightConnector1">
-            <a:avLst/>
-          </a:prstGeom>
-          <a:ln>
-            <a:tailEnd type="triangle"/>
-          </a:ln>
-        </p:spPr>
-        <p:style>
-          <a:lnRef idx="3">
-            <a:schemeClr val="accent5"/>
-          </a:lnRef>
-          <a:fillRef idx="0">
-            <a:schemeClr val="accent5"/>
-          </a:fillRef>
-          <a:effectRef idx="2">
-            <a:schemeClr val="accent5"/>
           </a:effectRef>
           <a:fontRef idx="minor">
             <a:schemeClr val="tx1"/>

</xml_diff>

<commit_message>
added time selection to buyservice.html and addet employee table do db
</commit_message>
<xml_diff>
--- a/Deliverables/Relational Model.pptx
+++ b/Deliverables/Relational Model.pptx
@@ -707,7 +707,7 @@
           <a:p>
             <a:fld id="{1A98E586-BE26-45CF-A16C-F0F962A0AAAF}" type="datetimeFigureOut">
               <a:rPr lang="en-US" smtClean="0"/>
-              <a:t>3/3/2022</a:t>
+              <a:t>4/14/2022</a:t>
             </a:fld>
             <a:endParaRPr lang="en-US"/>
           </a:p>
@@ -877,7 +877,7 @@
           <a:p>
             <a:fld id="{1A98E586-BE26-45CF-A16C-F0F962A0AAAF}" type="datetimeFigureOut">
               <a:rPr lang="en-US" smtClean="0"/>
-              <a:t>3/3/2022</a:t>
+              <a:t>4/14/2022</a:t>
             </a:fld>
             <a:endParaRPr lang="en-US"/>
           </a:p>
@@ -1057,7 +1057,7 @@
           <a:p>
             <a:fld id="{1A98E586-BE26-45CF-A16C-F0F962A0AAAF}" type="datetimeFigureOut">
               <a:rPr lang="en-US" smtClean="0"/>
-              <a:t>3/3/2022</a:t>
+              <a:t>4/14/2022</a:t>
             </a:fld>
             <a:endParaRPr lang="en-US"/>
           </a:p>
@@ -1227,7 +1227,7 @@
           <a:p>
             <a:fld id="{1A98E586-BE26-45CF-A16C-F0F962A0AAAF}" type="datetimeFigureOut">
               <a:rPr lang="en-US" smtClean="0"/>
-              <a:t>3/3/2022</a:t>
+              <a:t>4/14/2022</a:t>
             </a:fld>
             <a:endParaRPr lang="en-US"/>
           </a:p>
@@ -1473,7 +1473,7 @@
           <a:p>
             <a:fld id="{1A98E586-BE26-45CF-A16C-F0F962A0AAAF}" type="datetimeFigureOut">
               <a:rPr lang="en-US" smtClean="0"/>
-              <a:t>3/3/2022</a:t>
+              <a:t>4/14/2022</a:t>
             </a:fld>
             <a:endParaRPr lang="en-US"/>
           </a:p>
@@ -1705,7 +1705,7 @@
           <a:p>
             <a:fld id="{1A98E586-BE26-45CF-A16C-F0F962A0AAAF}" type="datetimeFigureOut">
               <a:rPr lang="en-US" smtClean="0"/>
-              <a:t>3/3/2022</a:t>
+              <a:t>4/14/2022</a:t>
             </a:fld>
             <a:endParaRPr lang="en-US"/>
           </a:p>
@@ -2072,7 +2072,7 @@
           <a:p>
             <a:fld id="{1A98E586-BE26-45CF-A16C-F0F962A0AAAF}" type="datetimeFigureOut">
               <a:rPr lang="en-US" smtClean="0"/>
-              <a:t>3/3/2022</a:t>
+              <a:t>4/14/2022</a:t>
             </a:fld>
             <a:endParaRPr lang="en-US"/>
           </a:p>
@@ -2190,7 +2190,7 @@
           <a:p>
             <a:fld id="{1A98E586-BE26-45CF-A16C-F0F962A0AAAF}" type="datetimeFigureOut">
               <a:rPr lang="en-US" smtClean="0"/>
-              <a:t>3/3/2022</a:t>
+              <a:t>4/14/2022</a:t>
             </a:fld>
             <a:endParaRPr lang="en-US"/>
           </a:p>
@@ -2285,7 +2285,7 @@
           <a:p>
             <a:fld id="{1A98E586-BE26-45CF-A16C-F0F962A0AAAF}" type="datetimeFigureOut">
               <a:rPr lang="en-US" smtClean="0"/>
-              <a:t>3/3/2022</a:t>
+              <a:t>4/14/2022</a:t>
             </a:fld>
             <a:endParaRPr lang="en-US"/>
           </a:p>
@@ -2562,7 +2562,7 @@
           <a:p>
             <a:fld id="{1A98E586-BE26-45CF-A16C-F0F962A0AAAF}" type="datetimeFigureOut">
               <a:rPr lang="en-US" smtClean="0"/>
-              <a:t>3/3/2022</a:t>
+              <a:t>4/14/2022</a:t>
             </a:fld>
             <a:endParaRPr lang="en-US"/>
           </a:p>
@@ -2819,7 +2819,7 @@
           <a:p>
             <a:fld id="{1A98E586-BE26-45CF-A16C-F0F962A0AAAF}" type="datetimeFigureOut">
               <a:rPr lang="en-US" smtClean="0"/>
-              <a:t>3/3/2022</a:t>
+              <a:t>4/14/2022</a:t>
             </a:fld>
             <a:endParaRPr lang="en-US"/>
           </a:p>
@@ -3032,7 +3032,7 @@
           <a:p>
             <a:fld id="{1A98E586-BE26-45CF-A16C-F0F962A0AAAF}" type="datetimeFigureOut">
               <a:rPr lang="en-US" smtClean="0"/>
-              <a:t>3/3/2022</a:t>
+              <a:t>4/14/2022</a:t>
             </a:fld>
             <a:endParaRPr lang="en-US"/>
           </a:p>
@@ -3490,12 +3490,12 @@
         <p:spPr>
           <a:xfrm>
             <a:off x="182881" y="1950790"/>
-            <a:ext cx="11853948" cy="4245823"/>
+            <a:ext cx="11853948" cy="4795243"/>
           </a:xfrm>
         </p:spPr>
         <p:txBody>
           <a:bodyPr>
-            <a:normAutofit lnSpcReduction="10000"/>
+            <a:normAutofit fontScale="92500" lnSpcReduction="10000"/>
           </a:bodyPr>
           <a:lstStyle/>
           <a:p>
@@ -3778,6 +3778,29 @@
             <a:r>
               <a:rPr lang="en-US" sz="1600" dirty="0" err="1"/>
               <a:t>FeeGB</a:t>
+            </a:r>
+            <a:r>
+              <a:rPr lang="en-US" sz="1600" dirty="0"/>
+              <a:t>)</a:t>
+            </a:r>
+          </a:p>
+          <a:p>
+            <a:pPr algn="l">
+              <a:lnSpc>
+                <a:spcPct val="250000"/>
+              </a:lnSpc>
+            </a:pPr>
+            <a:r>
+              <a:rPr lang="en-US" sz="1600" dirty="0"/>
+              <a:t>Employee(</a:t>
+            </a:r>
+            <a:r>
+              <a:rPr lang="en-US" sz="1600" b="1" dirty="0" err="1"/>
+              <a:t>ID</a:t>
+            </a:r>
+            <a:r>
+              <a:rPr lang="en-US" sz="1600" dirty="0" err="1"/>
+              <a:t>,Password</a:t>
             </a:r>
             <a:r>
               <a:rPr lang="en-US" sz="1600" dirty="0"/>

</xml_diff>

<commit_message>
updated db with counter of failed attempts in user table
</commit_message>
<xml_diff>
--- a/Deliverables/Relational Model.pptx
+++ b/Deliverables/Relational Model.pptx
@@ -707,7 +707,7 @@
           <a:p>
             <a:fld id="{1A98E586-BE26-45CF-A16C-F0F962A0AAAF}" type="datetimeFigureOut">
               <a:rPr lang="en-US" smtClean="0"/>
-              <a:t>4/14/2022</a:t>
+              <a:t>5/4/2022</a:t>
             </a:fld>
             <a:endParaRPr lang="en-US"/>
           </a:p>
@@ -877,7 +877,7 @@
           <a:p>
             <a:fld id="{1A98E586-BE26-45CF-A16C-F0F962A0AAAF}" type="datetimeFigureOut">
               <a:rPr lang="en-US" smtClean="0"/>
-              <a:t>4/14/2022</a:t>
+              <a:t>5/4/2022</a:t>
             </a:fld>
             <a:endParaRPr lang="en-US"/>
           </a:p>
@@ -1057,7 +1057,7 @@
           <a:p>
             <a:fld id="{1A98E586-BE26-45CF-A16C-F0F962A0AAAF}" type="datetimeFigureOut">
               <a:rPr lang="en-US" smtClean="0"/>
-              <a:t>4/14/2022</a:t>
+              <a:t>5/4/2022</a:t>
             </a:fld>
             <a:endParaRPr lang="en-US"/>
           </a:p>
@@ -1227,7 +1227,7 @@
           <a:p>
             <a:fld id="{1A98E586-BE26-45CF-A16C-F0F962A0AAAF}" type="datetimeFigureOut">
               <a:rPr lang="en-US" smtClean="0"/>
-              <a:t>4/14/2022</a:t>
+              <a:t>5/4/2022</a:t>
             </a:fld>
             <a:endParaRPr lang="en-US"/>
           </a:p>
@@ -1473,7 +1473,7 @@
           <a:p>
             <a:fld id="{1A98E586-BE26-45CF-A16C-F0F962A0AAAF}" type="datetimeFigureOut">
               <a:rPr lang="en-US" smtClean="0"/>
-              <a:t>4/14/2022</a:t>
+              <a:t>5/4/2022</a:t>
             </a:fld>
             <a:endParaRPr lang="en-US"/>
           </a:p>
@@ -1705,7 +1705,7 @@
           <a:p>
             <a:fld id="{1A98E586-BE26-45CF-A16C-F0F962A0AAAF}" type="datetimeFigureOut">
               <a:rPr lang="en-US" smtClean="0"/>
-              <a:t>4/14/2022</a:t>
+              <a:t>5/4/2022</a:t>
             </a:fld>
             <a:endParaRPr lang="en-US"/>
           </a:p>
@@ -2072,7 +2072,7 @@
           <a:p>
             <a:fld id="{1A98E586-BE26-45CF-A16C-F0F962A0AAAF}" type="datetimeFigureOut">
               <a:rPr lang="en-US" smtClean="0"/>
-              <a:t>4/14/2022</a:t>
+              <a:t>5/4/2022</a:t>
             </a:fld>
             <a:endParaRPr lang="en-US"/>
           </a:p>
@@ -2190,7 +2190,7 @@
           <a:p>
             <a:fld id="{1A98E586-BE26-45CF-A16C-F0F962A0AAAF}" type="datetimeFigureOut">
               <a:rPr lang="en-US" smtClean="0"/>
-              <a:t>4/14/2022</a:t>
+              <a:t>5/4/2022</a:t>
             </a:fld>
             <a:endParaRPr lang="en-US"/>
           </a:p>
@@ -2285,7 +2285,7 @@
           <a:p>
             <a:fld id="{1A98E586-BE26-45CF-A16C-F0F962A0AAAF}" type="datetimeFigureOut">
               <a:rPr lang="en-US" smtClean="0"/>
-              <a:t>4/14/2022</a:t>
+              <a:t>5/4/2022</a:t>
             </a:fld>
             <a:endParaRPr lang="en-US"/>
           </a:p>
@@ -2562,7 +2562,7 @@
           <a:p>
             <a:fld id="{1A98E586-BE26-45CF-A16C-F0F962A0AAAF}" type="datetimeFigureOut">
               <a:rPr lang="en-US" smtClean="0"/>
-              <a:t>4/14/2022</a:t>
+              <a:t>5/4/2022</a:t>
             </a:fld>
             <a:endParaRPr lang="en-US"/>
           </a:p>
@@ -2819,7 +2819,7 @@
           <a:p>
             <a:fld id="{1A98E586-BE26-45CF-A16C-F0F962A0AAAF}" type="datetimeFigureOut">
               <a:rPr lang="en-US" smtClean="0"/>
-              <a:t>4/14/2022</a:t>
+              <a:t>5/4/2022</a:t>
             </a:fld>
             <a:endParaRPr lang="en-US"/>
           </a:p>
@@ -3032,7 +3032,7 @@
           <a:p>
             <a:fld id="{1A98E586-BE26-45CF-A16C-F0F962A0AAAF}" type="datetimeFigureOut">
               <a:rPr lang="en-US" smtClean="0"/>
-              <a:t>4/14/2022</a:t>
+              <a:t>5/4/2022</a:t>
             </a:fld>
             <a:endParaRPr lang="en-US"/>
           </a:p>
@@ -3506,7 +3506,7 @@
             </a:pPr>
             <a:r>
               <a:rPr lang="en-US" sz="1600" dirty="0"/>
-              <a:t>Order(</a:t>
+              <a:t>Orders(</a:t>
             </a:r>
             <a:r>
               <a:rPr lang="en-US" sz="1600" b="1" dirty="0" err="1"/>
@@ -3608,13 +3608,14 @@
               <a:t>, Email, Password, </a:t>
             </a:r>
             <a:r>
-              <a:rPr lang="en-US" sz="1600" dirty="0" err="1"/>
+              <a:rPr lang="en-US" sz="1600" err="1"/>
               <a:t>isInsolvent</a:t>
             </a:r>
             <a:r>
-              <a:rPr lang="en-US" sz="1600" dirty="0"/>
-              <a:t>)</a:t>
-            </a:r>
+              <a:rPr lang="en-US" sz="1600"/>
+              <a:t>,FailedAttempts)</a:t>
+            </a:r>
+            <a:endParaRPr lang="en-US" sz="1600" dirty="0"/>
           </a:p>
           <a:p>
             <a:pPr algn="l">

</xml_diff>

<commit_message>
updated Alert Table and updated UserService.setUserInsolvent
</commit_message>
<xml_diff>
--- a/Deliverables/Relational Model.pptx
+++ b/Deliverables/Relational Model.pptx
@@ -707,7 +707,7 @@
           <a:p>
             <a:fld id="{1A98E586-BE26-45CF-A16C-F0F962A0AAAF}" type="datetimeFigureOut">
               <a:rPr lang="en-US" smtClean="0"/>
-              <a:t>5/4/2022</a:t>
+              <a:t>5/10/2022</a:t>
             </a:fld>
             <a:endParaRPr lang="en-US"/>
           </a:p>
@@ -877,7 +877,7 @@
           <a:p>
             <a:fld id="{1A98E586-BE26-45CF-A16C-F0F962A0AAAF}" type="datetimeFigureOut">
               <a:rPr lang="en-US" smtClean="0"/>
-              <a:t>5/4/2022</a:t>
+              <a:t>5/10/2022</a:t>
             </a:fld>
             <a:endParaRPr lang="en-US"/>
           </a:p>
@@ -1057,7 +1057,7 @@
           <a:p>
             <a:fld id="{1A98E586-BE26-45CF-A16C-F0F962A0AAAF}" type="datetimeFigureOut">
               <a:rPr lang="en-US" smtClean="0"/>
-              <a:t>5/4/2022</a:t>
+              <a:t>5/10/2022</a:t>
             </a:fld>
             <a:endParaRPr lang="en-US"/>
           </a:p>
@@ -1227,7 +1227,7 @@
           <a:p>
             <a:fld id="{1A98E586-BE26-45CF-A16C-F0F962A0AAAF}" type="datetimeFigureOut">
               <a:rPr lang="en-US" smtClean="0"/>
-              <a:t>5/4/2022</a:t>
+              <a:t>5/10/2022</a:t>
             </a:fld>
             <a:endParaRPr lang="en-US"/>
           </a:p>
@@ -1473,7 +1473,7 @@
           <a:p>
             <a:fld id="{1A98E586-BE26-45CF-A16C-F0F962A0AAAF}" type="datetimeFigureOut">
               <a:rPr lang="en-US" smtClean="0"/>
-              <a:t>5/4/2022</a:t>
+              <a:t>5/10/2022</a:t>
             </a:fld>
             <a:endParaRPr lang="en-US"/>
           </a:p>
@@ -1705,7 +1705,7 @@
           <a:p>
             <a:fld id="{1A98E586-BE26-45CF-A16C-F0F962A0AAAF}" type="datetimeFigureOut">
               <a:rPr lang="en-US" smtClean="0"/>
-              <a:t>5/4/2022</a:t>
+              <a:t>5/10/2022</a:t>
             </a:fld>
             <a:endParaRPr lang="en-US"/>
           </a:p>
@@ -2072,7 +2072,7 @@
           <a:p>
             <a:fld id="{1A98E586-BE26-45CF-A16C-F0F962A0AAAF}" type="datetimeFigureOut">
               <a:rPr lang="en-US" smtClean="0"/>
-              <a:t>5/4/2022</a:t>
+              <a:t>5/10/2022</a:t>
             </a:fld>
             <a:endParaRPr lang="en-US"/>
           </a:p>
@@ -2190,7 +2190,7 @@
           <a:p>
             <a:fld id="{1A98E586-BE26-45CF-A16C-F0F962A0AAAF}" type="datetimeFigureOut">
               <a:rPr lang="en-US" smtClean="0"/>
-              <a:t>5/4/2022</a:t>
+              <a:t>5/10/2022</a:t>
             </a:fld>
             <a:endParaRPr lang="en-US"/>
           </a:p>
@@ -2285,7 +2285,7 @@
           <a:p>
             <a:fld id="{1A98E586-BE26-45CF-A16C-F0F962A0AAAF}" type="datetimeFigureOut">
               <a:rPr lang="en-US" smtClean="0"/>
-              <a:t>5/4/2022</a:t>
+              <a:t>5/10/2022</a:t>
             </a:fld>
             <a:endParaRPr lang="en-US"/>
           </a:p>
@@ -2562,7 +2562,7 @@
           <a:p>
             <a:fld id="{1A98E586-BE26-45CF-A16C-F0F962A0AAAF}" type="datetimeFigureOut">
               <a:rPr lang="en-US" smtClean="0"/>
-              <a:t>5/4/2022</a:t>
+              <a:t>5/10/2022</a:t>
             </a:fld>
             <a:endParaRPr lang="en-US"/>
           </a:p>
@@ -2819,7 +2819,7 @@
           <a:p>
             <a:fld id="{1A98E586-BE26-45CF-A16C-F0F962A0AAAF}" type="datetimeFigureOut">
               <a:rPr lang="en-US" smtClean="0"/>
-              <a:t>5/4/2022</a:t>
+              <a:t>5/10/2022</a:t>
             </a:fld>
             <a:endParaRPr lang="en-US"/>
           </a:p>
@@ -3032,7 +3032,7 @@
           <a:p>
             <a:fld id="{1A98E586-BE26-45CF-A16C-F0F962A0AAAF}" type="datetimeFigureOut">
               <a:rPr lang="en-US" smtClean="0"/>
-              <a:t>5/4/2022</a:t>
+              <a:t>5/10/2022</a:t>
             </a:fld>
             <a:endParaRPr lang="en-US"/>
           </a:p>
@@ -3608,14 +3608,13 @@
               <a:t>, Email, Password, </a:t>
             </a:r>
             <a:r>
-              <a:rPr lang="en-US" sz="1600" err="1"/>
-              <a:t>isInsolvent</a:t>
-            </a:r>
-            <a:r>
-              <a:rPr lang="en-US" sz="1600"/>
-              <a:t>,FailedAttempts)</a:t>
-            </a:r>
-            <a:endParaRPr lang="en-US" sz="1600" dirty="0"/>
+              <a:rPr lang="en-US" sz="1600" dirty="0" err="1"/>
+              <a:t>isInsolvent,FailedAttempts</a:t>
+            </a:r>
+            <a:r>
+              <a:rPr lang="en-US" sz="1600" dirty="0"/>
+              <a:t>)</a:t>
+            </a:r>
           </a:p>
           <a:p>
             <a:pPr algn="l">
@@ -3638,6 +3637,14 @@
             <a:r>
               <a:rPr lang="en-US" sz="1600" u="sng" dirty="0" err="1"/>
               <a:t>Username</a:t>
+            </a:r>
+            <a:r>
+              <a:rPr lang="en-US" sz="1600" b="1" u="sng" dirty="0" err="1"/>
+              <a:t>,</a:t>
+            </a:r>
+            <a:r>
+              <a:rPr lang="en-US" sz="1600" u="sng" dirty="0" err="1"/>
+              <a:t>Emajl</a:t>
             </a:r>
             <a:r>
               <a:rPr lang="en-US" sz="1600" b="1" u="sng" dirty="0"/>
@@ -4327,6 +4334,47 @@
           </a:fontRef>
         </p:style>
       </p:cxnSp>
+      <p:cxnSp>
+        <p:nvCxnSpPr>
+          <p:cNvPr id="17" name="Connettore 2 16">
+            <a:extLst>
+              <a:ext uri="{FF2B5EF4-FFF2-40B4-BE49-F238E27FC236}">
+                <a16:creationId xmlns:a16="http://schemas.microsoft.com/office/drawing/2014/main" id="{B74F68AE-83A0-8D4E-36DE-774D5A21F291}"/>
+              </a:ext>
+            </a:extLst>
+          </p:cNvPr>
+          <p:cNvCxnSpPr>
+            <a:cxnSpLocks/>
+          </p:cNvCxnSpPr>
+          <p:nvPr/>
+        </p:nvCxnSpPr>
+        <p:spPr>
+          <a:xfrm flipH="1" flipV="1">
+            <a:off x="1882065" y="3086820"/>
+            <a:ext cx="435006" cy="559294"/>
+          </a:xfrm>
+          <a:prstGeom prst="straightConnector1">
+            <a:avLst/>
+          </a:prstGeom>
+          <a:ln>
+            <a:tailEnd type="triangle"/>
+          </a:ln>
+        </p:spPr>
+        <p:style>
+          <a:lnRef idx="3">
+            <a:schemeClr val="accent5"/>
+          </a:lnRef>
+          <a:fillRef idx="0">
+            <a:schemeClr val="accent5"/>
+          </a:fillRef>
+          <a:effectRef idx="2">
+            <a:schemeClr val="accent5"/>
+          </a:effectRef>
+          <a:fontRef idx="minor">
+            <a:schemeClr val="tx1"/>
+          </a:fontRef>
+        </p:style>
+      </p:cxnSp>
     </p:spTree>
     <p:extLst>
       <p:ext uri="{BB962C8B-B14F-4D97-AF65-F5344CB8AC3E}">

</xml_diff>